<commit_message>
Upgraded apache poi to 3.17
</commit_message>
<xml_diff>
--- a/src/test/resources/com/hp/autonomy/frontend/reports/powerpoint/validTemplateWithLogo.pptx
+++ b/src/test/resources/com/hp/autonomy/frontend/reports/powerpoint/validTemplateWithLogo.pptx
@@ -7,6 +7,7 @@
   <p:sldIdLst>
     <p:sldId id="256" r:id="rId2"/>
     <p:sldId id="257" r:id="rId3"/>
+    <p:sldId id="258" r:id="rId4"/>
   </p:sldIdLst>
   <p:sldSz cx="12192000" cy="6858000"/>
   <p:notesSz cx="6858000" cy="9144000"/>
@@ -113,8 +114,12 @@
 </p:presentation>
 </file>
 
+<file path=ppt/revisionInfo.xml><?xml version="1.0" encoding="utf-8"?>
+<p1510:revInfo xmlns:a="http://schemas.openxmlformats.org/drawingml/2006/main" xmlns:r="http://schemas.openxmlformats.org/officeDocument/2006/relationships" xmlns:p1510="http://schemas.microsoft.com/office/powerpoint/2015/10/main"/>
+</file>
+
 <file path=ppt/charts/chart1.xml><?xml version="1.0" encoding="utf-8"?>
-<c:chartSpace xmlns:c="http://schemas.openxmlformats.org/drawingml/2006/chart" xmlns:a="http://schemas.openxmlformats.org/drawingml/2006/main" xmlns:r="http://schemas.openxmlformats.org/officeDocument/2006/relationships">
+<c:chartSpace xmlns:c="http://schemas.openxmlformats.org/drawingml/2006/chart" xmlns:a="http://schemas.openxmlformats.org/drawingml/2006/main" xmlns:r="http://schemas.openxmlformats.org/officeDocument/2006/relationships" xmlns:c16r2="http://schemas.microsoft.com/office/drawing/2015/06/chart">
   <c:date1904 val="0"/>
   <c:lang val="en-US"/>
   <c:roundedCorners val="0"/>
@@ -128,7 +133,6 @@
   </mc:AlternateContent>
   <c:chart>
     <c:title>
-      <c:layout/>
       <c:overlay val="0"/>
       <c:spPr>
         <a:noFill/>
@@ -201,6 +205,11 @@
               </a:ln>
               <a:effectLst/>
             </c:spPr>
+            <c:extLst>
+              <c:ext xmlns:c16="http://schemas.microsoft.com/office/drawing/2014/chart" uri="{C3380CC4-5D6E-409C-BE32-E72D297353CC}">
+                <c16:uniqueId val="{00000001-22EA-4720-B401-B5D70712D0B4}"/>
+              </c:ext>
+            </c:extLst>
           </c:dPt>
           <c:dPt>
             <c:idx val="1"/>
@@ -216,6 +225,11 @@
               </a:ln>
               <a:effectLst/>
             </c:spPr>
+            <c:extLst>
+              <c:ext xmlns:c16="http://schemas.microsoft.com/office/drawing/2014/chart" uri="{C3380CC4-5D6E-409C-BE32-E72D297353CC}">
+                <c16:uniqueId val="{00000003-22EA-4720-B401-B5D70712D0B4}"/>
+              </c:ext>
+            </c:extLst>
           </c:dPt>
           <c:dPt>
             <c:idx val="2"/>
@@ -231,6 +245,11 @@
               </a:ln>
               <a:effectLst/>
             </c:spPr>
+            <c:extLst>
+              <c:ext xmlns:c16="http://schemas.microsoft.com/office/drawing/2014/chart" uri="{C3380CC4-5D6E-409C-BE32-E72D297353CC}">
+                <c16:uniqueId val="{00000005-22EA-4720-B401-B5D70712D0B4}"/>
+              </c:ext>
+            </c:extLst>
           </c:dPt>
           <c:dPt>
             <c:idx val="3"/>
@@ -246,6 +265,11 @@
               </a:ln>
               <a:effectLst/>
             </c:spPr>
+            <c:extLst>
+              <c:ext xmlns:c16="http://schemas.microsoft.com/office/drawing/2014/chart" uri="{C3380CC4-5D6E-409C-BE32-E72D297353CC}">
+                <c16:uniqueId val="{00000007-22EA-4720-B401-B5D70712D0B4}"/>
+              </c:ext>
+            </c:extLst>
           </c:dPt>
           <c:dPt>
             <c:idx val="4"/>
@@ -261,6 +285,11 @@
               </a:ln>
               <a:effectLst/>
             </c:spPr>
+            <c:extLst>
+              <c:ext xmlns:c16="http://schemas.microsoft.com/office/drawing/2014/chart" uri="{C3380CC4-5D6E-409C-BE32-E72D297353CC}">
+                <c16:uniqueId val="{00000009-22EA-4720-B401-B5D70712D0B4}"/>
+              </c:ext>
+            </c:extLst>
           </c:dPt>
           <c:dPt>
             <c:idx val="5"/>
@@ -276,6 +305,11 @@
               </a:ln>
               <a:effectLst/>
             </c:spPr>
+            <c:extLst>
+              <c:ext xmlns:c16="http://schemas.microsoft.com/office/drawing/2014/chart" uri="{C3380CC4-5D6E-409C-BE32-E72D297353CC}">
+                <c16:uniqueId val="{0000000B-22EA-4720-B401-B5D70712D0B4}"/>
+              </c:ext>
+            </c:extLst>
           </c:dPt>
           <c:dPt>
             <c:idx val="6"/>
@@ -293,6 +327,11 @@
               </a:ln>
               <a:effectLst/>
             </c:spPr>
+            <c:extLst>
+              <c:ext xmlns:c16="http://schemas.microsoft.com/office/drawing/2014/chart" uri="{C3380CC4-5D6E-409C-BE32-E72D297353CC}">
+                <c16:uniqueId val="{0000000D-22EA-4720-B401-B5D70712D0B4}"/>
+              </c:ext>
+            </c:extLst>
           </c:dPt>
           <c:dPt>
             <c:idx val="7"/>
@@ -310,6 +349,11 @@
               </a:ln>
               <a:effectLst/>
             </c:spPr>
+            <c:extLst>
+              <c:ext xmlns:c16="http://schemas.microsoft.com/office/drawing/2014/chart" uri="{C3380CC4-5D6E-409C-BE32-E72D297353CC}">
+                <c16:uniqueId val="{0000000F-22EA-4720-B401-B5D70712D0B4}"/>
+              </c:ext>
+            </c:extLst>
           </c:dPt>
           <c:dPt>
             <c:idx val="8"/>
@@ -327,6 +371,11 @@
               </a:ln>
               <a:effectLst/>
             </c:spPr>
+            <c:extLst>
+              <c:ext xmlns:c16="http://schemas.microsoft.com/office/drawing/2014/chart" uri="{C3380CC4-5D6E-409C-BE32-E72D297353CC}">
+                <c16:uniqueId val="{00000011-22EA-4720-B401-B5D70712D0B4}"/>
+              </c:ext>
+            </c:extLst>
           </c:dPt>
           <c:dPt>
             <c:idx val="9"/>
@@ -344,6 +393,11 @@
               </a:ln>
               <a:effectLst/>
             </c:spPr>
+            <c:extLst>
+              <c:ext xmlns:c16="http://schemas.microsoft.com/office/drawing/2014/chart" uri="{C3380CC4-5D6E-409C-BE32-E72D297353CC}">
+                <c16:uniqueId val="{00000013-22EA-4720-B401-B5D70712D0B4}"/>
+              </c:ext>
+            </c:extLst>
           </c:dPt>
           <c:dPt>
             <c:idx val="10"/>
@@ -361,6 +415,11 @@
               </a:ln>
               <a:effectLst/>
             </c:spPr>
+            <c:extLst>
+              <c:ext xmlns:c16="http://schemas.microsoft.com/office/drawing/2014/chart" uri="{C3380CC4-5D6E-409C-BE32-E72D297353CC}">
+                <c16:uniqueId val="{00000015-22EA-4720-B401-B5D70712D0B4}"/>
+              </c:ext>
+            </c:extLst>
           </c:dPt>
           <c:dPt>
             <c:idx val="11"/>
@@ -378,6 +437,11 @@
               </a:ln>
               <a:effectLst/>
             </c:spPr>
+            <c:extLst>
+              <c:ext xmlns:c16="http://schemas.microsoft.com/office/drawing/2014/chart" uri="{C3380CC4-5D6E-409C-BE32-E72D297353CC}">
+                <c16:uniqueId val="{00000017-22EA-4720-B401-B5D70712D0B4}"/>
+              </c:ext>
+            </c:extLst>
           </c:dPt>
           <c:dPt>
             <c:idx val="12"/>
@@ -396,6 +460,11 @@
               </a:ln>
               <a:effectLst/>
             </c:spPr>
+            <c:extLst>
+              <c:ext xmlns:c16="http://schemas.microsoft.com/office/drawing/2014/chart" uri="{C3380CC4-5D6E-409C-BE32-E72D297353CC}">
+                <c16:uniqueId val="{00000019-22EA-4720-B401-B5D70712D0B4}"/>
+              </c:ext>
+            </c:extLst>
           </c:dPt>
           <c:dPt>
             <c:idx val="13"/>
@@ -414,6 +483,11 @@
               </a:ln>
               <a:effectLst/>
             </c:spPr>
+            <c:extLst>
+              <c:ext xmlns:c16="http://schemas.microsoft.com/office/drawing/2014/chart" uri="{C3380CC4-5D6E-409C-BE32-E72D297353CC}">
+                <c16:uniqueId val="{0000001B-22EA-4720-B401-B5D70712D0B4}"/>
+              </c:ext>
+            </c:extLst>
           </c:dPt>
           <c:dPt>
             <c:idx val="14"/>
@@ -432,6 +506,11 @@
               </a:ln>
               <a:effectLst/>
             </c:spPr>
+            <c:extLst>
+              <c:ext xmlns:c16="http://schemas.microsoft.com/office/drawing/2014/chart" uri="{C3380CC4-5D6E-409C-BE32-E72D297353CC}">
+                <c16:uniqueId val="{0000001D-22EA-4720-B401-B5D70712D0B4}"/>
+              </c:ext>
+            </c:extLst>
           </c:dPt>
           <c:dPt>
             <c:idx val="15"/>
@@ -450,6 +529,11 @@
               </a:ln>
               <a:effectLst/>
             </c:spPr>
+            <c:extLst>
+              <c:ext xmlns:c16="http://schemas.microsoft.com/office/drawing/2014/chart" uri="{C3380CC4-5D6E-409C-BE32-E72D297353CC}">
+                <c16:uniqueId val="{0000001F-22EA-4720-B401-B5D70712D0B4}"/>
+              </c:ext>
+            </c:extLst>
           </c:dPt>
           <c:cat>
             <c:strRef>
@@ -564,6 +648,11 @@
               </c:numCache>
             </c:numRef>
           </c:val>
+          <c:extLst>
+            <c:ext xmlns:c16="http://schemas.microsoft.com/office/drawing/2014/chart" uri="{C3380CC4-5D6E-409C-BE32-E72D297353CC}">
+              <c16:uniqueId val="{00000020-22EA-4720-B401-B5D70712D0B4}"/>
+            </c:ext>
+          </c:extLst>
         </c:ser>
         <c:dLbls>
           <c:showLegendKey val="0"/>
@@ -587,7 +676,6 @@
     </c:plotArea>
     <c:legend>
       <c:legendPos val="r"/>
-      <c:layout/>
       <c:overlay val="0"/>
       <c:spPr>
         <a:noFill/>
@@ -645,7 +733,7 @@
 </file>
 
 <file path=ppt/charts/chart2.xml><?xml version="1.0" encoding="utf-8"?>
-<c:chartSpace xmlns:c="http://schemas.openxmlformats.org/drawingml/2006/chart" xmlns:a="http://schemas.openxmlformats.org/drawingml/2006/main" xmlns:r="http://schemas.openxmlformats.org/officeDocument/2006/relationships">
+<c:chartSpace xmlns:c="http://schemas.openxmlformats.org/drawingml/2006/chart" xmlns:a="http://schemas.openxmlformats.org/drawingml/2006/main" xmlns:r="http://schemas.openxmlformats.org/officeDocument/2006/relationships" xmlns:c16r2="http://schemas.microsoft.com/office/drawing/2015/06/chart">
   <c:date1904 val="0"/>
   <c:lang val="en-US"/>
   <c:roundedCorners val="0"/>
@@ -836,6 +924,11 @@
             </c:numRef>
           </c:yVal>
           <c:smooth val="0"/>
+          <c:extLst>
+            <c:ext xmlns:c16="http://schemas.microsoft.com/office/drawing/2014/chart" uri="{C3380CC4-5D6E-409C-BE32-E72D297353CC}">
+              <c16:uniqueId val="{00000000-ACB0-4F26-ADDE-5B3D503CD93D}"/>
+            </c:ext>
+          </c:extLst>
         </c:ser>
         <c:dLbls>
           <c:showLegendKey val="0"/>
@@ -916,6 +1009,11 @@
               </a:ln>
               <a:effectLst/>
             </c:spPr>
+            <c:extLst>
+              <c:ext xmlns:c16="http://schemas.microsoft.com/office/drawing/2014/chart" uri="{C3380CC4-5D6E-409C-BE32-E72D297353CC}">
+                <c16:uniqueId val="{00000002-ACB0-4F26-ADDE-5B3D503CD93D}"/>
+              </c:ext>
+            </c:extLst>
           </c:dPt>
           <c:dPt>
             <c:idx val="1"/>
@@ -944,6 +1042,11 @@
               </a:ln>
               <a:effectLst/>
             </c:spPr>
+            <c:extLst>
+              <c:ext xmlns:c16="http://schemas.microsoft.com/office/drawing/2014/chart" uri="{C3380CC4-5D6E-409C-BE32-E72D297353CC}">
+                <c16:uniqueId val="{00000004-ACB0-4F26-ADDE-5B3D503CD93D}"/>
+              </c:ext>
+            </c:extLst>
           </c:dPt>
           <c:dPt>
             <c:idx val="2"/>
@@ -972,6 +1075,11 @@
               </a:ln>
               <a:effectLst/>
             </c:spPr>
+            <c:extLst>
+              <c:ext xmlns:c16="http://schemas.microsoft.com/office/drawing/2014/chart" uri="{C3380CC4-5D6E-409C-BE32-E72D297353CC}">
+                <c16:uniqueId val="{00000006-ACB0-4F26-ADDE-5B3D503CD93D}"/>
+              </c:ext>
+            </c:extLst>
           </c:dPt>
           <c:dPt>
             <c:idx val="3"/>
@@ -1000,6 +1108,11 @@
               </a:ln>
               <a:effectLst/>
             </c:spPr>
+            <c:extLst>
+              <c:ext xmlns:c16="http://schemas.microsoft.com/office/drawing/2014/chart" uri="{C3380CC4-5D6E-409C-BE32-E72D297353CC}">
+                <c16:uniqueId val="{00000008-ACB0-4F26-ADDE-5B3D503CD93D}"/>
+              </c:ext>
+            </c:extLst>
           </c:dPt>
           <c:dPt>
             <c:idx val="4"/>
@@ -1028,6 +1141,11 @@
               </a:ln>
               <a:effectLst/>
             </c:spPr>
+            <c:extLst>
+              <c:ext xmlns:c16="http://schemas.microsoft.com/office/drawing/2014/chart" uri="{C3380CC4-5D6E-409C-BE32-E72D297353CC}">
+                <c16:uniqueId val="{0000000A-ACB0-4F26-ADDE-5B3D503CD93D}"/>
+              </c:ext>
+            </c:extLst>
           </c:dPt>
           <c:dPt>
             <c:idx val="5"/>
@@ -1056,6 +1174,11 @@
               </a:ln>
               <a:effectLst/>
             </c:spPr>
+            <c:extLst>
+              <c:ext xmlns:c16="http://schemas.microsoft.com/office/drawing/2014/chart" uri="{C3380CC4-5D6E-409C-BE32-E72D297353CC}">
+                <c16:uniqueId val="{0000000C-ACB0-4F26-ADDE-5B3D503CD93D}"/>
+              </c:ext>
+            </c:extLst>
           </c:dPt>
           <c:dPt>
             <c:idx val="6"/>
@@ -1084,6 +1207,11 @@
               </a:ln>
               <a:effectLst/>
             </c:spPr>
+            <c:extLst>
+              <c:ext xmlns:c16="http://schemas.microsoft.com/office/drawing/2014/chart" uri="{C3380CC4-5D6E-409C-BE32-E72D297353CC}">
+                <c16:uniqueId val="{0000000E-ACB0-4F26-ADDE-5B3D503CD93D}"/>
+              </c:ext>
+            </c:extLst>
           </c:dPt>
           <c:dPt>
             <c:idx val="7"/>
@@ -1112,6 +1240,11 @@
               </a:ln>
               <a:effectLst/>
             </c:spPr>
+            <c:extLst>
+              <c:ext xmlns:c16="http://schemas.microsoft.com/office/drawing/2014/chart" uri="{C3380CC4-5D6E-409C-BE32-E72D297353CC}">
+                <c16:uniqueId val="{00000010-ACB0-4F26-ADDE-5B3D503CD93D}"/>
+              </c:ext>
+            </c:extLst>
           </c:dPt>
           <c:dPt>
             <c:idx val="8"/>
@@ -1140,6 +1273,11 @@
               </a:ln>
               <a:effectLst/>
             </c:spPr>
+            <c:extLst>
+              <c:ext xmlns:c16="http://schemas.microsoft.com/office/drawing/2014/chart" uri="{C3380CC4-5D6E-409C-BE32-E72D297353CC}">
+                <c16:uniqueId val="{00000012-ACB0-4F26-ADDE-5B3D503CD93D}"/>
+              </c:ext>
+            </c:extLst>
           </c:dPt>
           <c:dPt>
             <c:idx val="9"/>
@@ -1168,6 +1306,11 @@
               </a:ln>
               <a:effectLst/>
             </c:spPr>
+            <c:extLst>
+              <c:ext xmlns:c16="http://schemas.microsoft.com/office/drawing/2014/chart" uri="{C3380CC4-5D6E-409C-BE32-E72D297353CC}">
+                <c16:uniqueId val="{00000014-ACB0-4F26-ADDE-5B3D503CD93D}"/>
+              </c:ext>
+            </c:extLst>
           </c:dPt>
           <c:dPt>
             <c:idx val="10"/>
@@ -1196,6 +1339,11 @@
               </a:ln>
               <a:effectLst/>
             </c:spPr>
+            <c:extLst>
+              <c:ext xmlns:c16="http://schemas.microsoft.com/office/drawing/2014/chart" uri="{C3380CC4-5D6E-409C-BE32-E72D297353CC}">
+                <c16:uniqueId val="{00000016-ACB0-4F26-ADDE-5B3D503CD93D}"/>
+              </c:ext>
+            </c:extLst>
           </c:dPt>
           <c:dPt>
             <c:idx val="11"/>
@@ -1224,6 +1372,11 @@
               </a:ln>
               <a:effectLst/>
             </c:spPr>
+            <c:extLst>
+              <c:ext xmlns:c16="http://schemas.microsoft.com/office/drawing/2014/chart" uri="{C3380CC4-5D6E-409C-BE32-E72D297353CC}">
+                <c16:uniqueId val="{00000018-ACB0-4F26-ADDE-5B3D503CD93D}"/>
+              </c:ext>
+            </c:extLst>
           </c:dPt>
           <c:dPt>
             <c:idx val="12"/>
@@ -1252,6 +1405,11 @@
               </a:ln>
               <a:effectLst/>
             </c:spPr>
+            <c:extLst>
+              <c:ext xmlns:c16="http://schemas.microsoft.com/office/drawing/2014/chart" uri="{C3380CC4-5D6E-409C-BE32-E72D297353CC}">
+                <c16:uniqueId val="{0000001A-ACB0-4F26-ADDE-5B3D503CD93D}"/>
+              </c:ext>
+            </c:extLst>
           </c:dPt>
           <c:dPt>
             <c:idx val="13"/>
@@ -1280,6 +1438,11 @@
               </a:ln>
               <a:effectLst/>
             </c:spPr>
+            <c:extLst>
+              <c:ext xmlns:c16="http://schemas.microsoft.com/office/drawing/2014/chart" uri="{C3380CC4-5D6E-409C-BE32-E72D297353CC}">
+                <c16:uniqueId val="{0000001C-ACB0-4F26-ADDE-5B3D503CD93D}"/>
+              </c:ext>
+            </c:extLst>
           </c:dPt>
           <c:dPt>
             <c:idx val="14"/>
@@ -1308,6 +1471,11 @@
               </a:ln>
               <a:effectLst/>
             </c:spPr>
+            <c:extLst>
+              <c:ext xmlns:c16="http://schemas.microsoft.com/office/drawing/2014/chart" uri="{C3380CC4-5D6E-409C-BE32-E72D297353CC}">
+                <c16:uniqueId val="{0000001E-ACB0-4F26-ADDE-5B3D503CD93D}"/>
+              </c:ext>
+            </c:extLst>
           </c:dPt>
           <c:dPt>
             <c:idx val="15"/>
@@ -1336,6 +1504,11 @@
               </a:ln>
               <a:effectLst/>
             </c:spPr>
+            <c:extLst>
+              <c:ext xmlns:c16="http://schemas.microsoft.com/office/drawing/2014/chart" uri="{C3380CC4-5D6E-409C-BE32-E72D297353CC}">
+                <c16:uniqueId val="{00000020-ACB0-4F26-ADDE-5B3D503CD93D}"/>
+              </c:ext>
+            </c:extLst>
           </c:dPt>
           <c:xVal>
             <c:numRef>
@@ -1464,6 +1637,11 @@
             </c:numRef>
           </c:yVal>
           <c:smooth val="0"/>
+          <c:extLst>
+            <c:ext xmlns:c16="http://schemas.microsoft.com/office/drawing/2014/chart" uri="{C3380CC4-5D6E-409C-BE32-E72D297353CC}">
+              <c16:uniqueId val="{00000021-ACB0-4F26-ADDE-5B3D503CD93D}"/>
+            </c:ext>
+          </c:extLst>
         </c:ser>
         <c:dLbls>
           <c:showLegendKey val="0"/>
@@ -1634,6 +1812,7 @@
         <c:minorTickMark val="none"/>
         <c:tickLblPos val="nextTo"/>
         <c:crossAx val="364005824"/>
+        <c:crosses val="autoZero"/>
         <c:crossBetween val="midCat"/>
       </c:valAx>
       <c:spPr>
@@ -1646,7 +1825,6 @@
     </c:plotArea>
     <c:legend>
       <c:legendPos val="t"/>
-      <c:layout/>
       <c:overlay val="0"/>
       <c:spPr>
         <a:noFill/>
@@ -1678,6 +1856,463 @@
     </c:legend>
     <c:plotVisOnly val="1"/>
     <c:dispBlanksAs val="span"/>
+    <c:showDLblsOverMax val="0"/>
+  </c:chart>
+  <c:spPr>
+    <a:noFill/>
+    <a:ln>
+      <a:noFill/>
+    </a:ln>
+    <a:effectLst/>
+  </c:spPr>
+  <c:txPr>
+    <a:bodyPr/>
+    <a:lstStyle/>
+    <a:p>
+      <a:pPr>
+        <a:defRPr/>
+      </a:pPr>
+      <a:endParaRPr lang="en-US"/>
+    </a:p>
+  </c:txPr>
+  <c:externalData r:id="rId3">
+    <c:autoUpdate val="0"/>
+  </c:externalData>
+</c:chartSpace>
+</file>
+
+<file path=ppt/charts/chart3.xml><?xml version="1.0" encoding="utf-8"?>
+<c:chartSpace xmlns:c="http://schemas.openxmlformats.org/drawingml/2006/chart" xmlns:a="http://schemas.openxmlformats.org/drawingml/2006/main" xmlns:r="http://schemas.openxmlformats.org/officeDocument/2006/relationships" xmlns:c16r2="http://schemas.microsoft.com/office/drawing/2015/06/chart">
+  <c:date1904 val="0"/>
+  <c:lang val="en-US"/>
+  <c:roundedCorners val="0"/>
+  <mc:AlternateContent xmlns:mc="http://schemas.openxmlformats.org/markup-compatibility/2006">
+    <mc:Choice xmlns:c14="http://schemas.microsoft.com/office/drawing/2007/8/2/chart" Requires="c14">
+      <c14:style val="102"/>
+    </mc:Choice>
+    <mc:Fallback>
+      <c:style val="2"/>
+    </mc:Fallback>
+  </mc:AlternateContent>
+  <c:chart>
+    <c:title>
+      <c:overlay val="0"/>
+      <c:spPr>
+        <a:noFill/>
+        <a:ln>
+          <a:noFill/>
+        </a:ln>
+        <a:effectLst/>
+      </c:spPr>
+      <c:txPr>
+        <a:bodyPr rot="0" spcFirstLastPara="1" vertOverflow="ellipsis" vert="horz" wrap="square" anchor="ctr" anchorCtr="1"/>
+        <a:lstStyle/>
+        <a:p>
+          <a:pPr>
+            <a:defRPr sz="1862" b="0" i="0" u="none" strike="noStrike" kern="1200" spc="0" baseline="0">
+              <a:solidFill>
+                <a:schemeClr val="tx1">
+                  <a:lumMod val="65000"/>
+                  <a:lumOff val="35000"/>
+                </a:schemeClr>
+              </a:solidFill>
+              <a:latin typeface="+mn-lt"/>
+              <a:ea typeface="+mn-ea"/>
+              <a:cs typeface="+mn-cs"/>
+            </a:defRPr>
+          </a:pPr>
+          <a:endParaRPr lang="en-US"/>
+        </a:p>
+      </c:txPr>
+    </c:title>
+    <c:autoTitleDeleted val="0"/>
+    <c:plotArea>
+      <c:layout/>
+      <c:barChart>
+        <c:barDir val="col"/>
+        <c:grouping val="clustered"/>
+        <c:varyColors val="0"/>
+        <c:ser>
+          <c:idx val="0"/>
+          <c:order val="0"/>
+          <c:tx>
+            <c:strRef>
+              <c:f>Sheet1!$B$1</c:f>
+              <c:strCache>
+                <c:ptCount val="1"/>
+                <c:pt idx="0">
+                  <c:v>Series 1</c:v>
+                </c:pt>
+              </c:strCache>
+            </c:strRef>
+          </c:tx>
+          <c:spPr>
+            <a:solidFill>
+              <a:schemeClr val="accent1"/>
+            </a:solidFill>
+            <a:ln>
+              <a:noFill/>
+            </a:ln>
+            <a:effectLst/>
+          </c:spPr>
+          <c:invertIfNegative val="0"/>
+          <c:cat>
+            <c:strRef>
+              <c:f>Sheet1!$A$2:$A$5</c:f>
+              <c:strCache>
+                <c:ptCount val="4"/>
+                <c:pt idx="0">
+                  <c:v>Category 1</c:v>
+                </c:pt>
+                <c:pt idx="1">
+                  <c:v>Category 2</c:v>
+                </c:pt>
+                <c:pt idx="2">
+                  <c:v>Category 3</c:v>
+                </c:pt>
+                <c:pt idx="3">
+                  <c:v>Category 4</c:v>
+                </c:pt>
+              </c:strCache>
+            </c:strRef>
+          </c:cat>
+          <c:val>
+            <c:numRef>
+              <c:f>Sheet1!$B$2:$B$5</c:f>
+              <c:numCache>
+                <c:formatCode>General</c:formatCode>
+                <c:ptCount val="4"/>
+                <c:pt idx="0">
+                  <c:v>4.3</c:v>
+                </c:pt>
+                <c:pt idx="1">
+                  <c:v>2.5</c:v>
+                </c:pt>
+                <c:pt idx="2">
+                  <c:v>3.5</c:v>
+                </c:pt>
+                <c:pt idx="3">
+                  <c:v>4.5</c:v>
+                </c:pt>
+              </c:numCache>
+            </c:numRef>
+          </c:val>
+          <c:extLst>
+            <c:ext xmlns:c16="http://schemas.microsoft.com/office/drawing/2014/chart" uri="{C3380CC4-5D6E-409C-BE32-E72D297353CC}">
+              <c16:uniqueId val="{00000000-940B-4F29-8944-8C88D58D7180}"/>
+            </c:ext>
+          </c:extLst>
+        </c:ser>
+        <c:ser>
+          <c:idx val="1"/>
+          <c:order val="1"/>
+          <c:tx>
+            <c:strRef>
+              <c:f>Sheet1!$C$1</c:f>
+              <c:strCache>
+                <c:ptCount val="1"/>
+                <c:pt idx="0">
+                  <c:v>Series 2</c:v>
+                </c:pt>
+              </c:strCache>
+            </c:strRef>
+          </c:tx>
+          <c:spPr>
+            <a:solidFill>
+              <a:schemeClr val="accent2"/>
+            </a:solidFill>
+            <a:ln>
+              <a:noFill/>
+            </a:ln>
+            <a:effectLst/>
+          </c:spPr>
+          <c:invertIfNegative val="0"/>
+          <c:cat>
+            <c:strRef>
+              <c:f>Sheet1!$A$2:$A$5</c:f>
+              <c:strCache>
+                <c:ptCount val="4"/>
+                <c:pt idx="0">
+                  <c:v>Category 1</c:v>
+                </c:pt>
+                <c:pt idx="1">
+                  <c:v>Category 2</c:v>
+                </c:pt>
+                <c:pt idx="2">
+                  <c:v>Category 3</c:v>
+                </c:pt>
+                <c:pt idx="3">
+                  <c:v>Category 4</c:v>
+                </c:pt>
+              </c:strCache>
+            </c:strRef>
+          </c:cat>
+          <c:val>
+            <c:numRef>
+              <c:f>Sheet1!$C$2:$C$5</c:f>
+              <c:numCache>
+                <c:formatCode>General</c:formatCode>
+                <c:ptCount val="4"/>
+                <c:pt idx="0">
+                  <c:v>2.4</c:v>
+                </c:pt>
+                <c:pt idx="1">
+                  <c:v>4.4000000000000004</c:v>
+                </c:pt>
+                <c:pt idx="2">
+                  <c:v>1.8</c:v>
+                </c:pt>
+                <c:pt idx="3">
+                  <c:v>2.8</c:v>
+                </c:pt>
+              </c:numCache>
+            </c:numRef>
+          </c:val>
+          <c:extLst>
+            <c:ext xmlns:c16="http://schemas.microsoft.com/office/drawing/2014/chart" uri="{C3380CC4-5D6E-409C-BE32-E72D297353CC}">
+              <c16:uniqueId val="{00000001-940B-4F29-8944-8C88D58D7180}"/>
+            </c:ext>
+          </c:extLst>
+        </c:ser>
+        <c:ser>
+          <c:idx val="2"/>
+          <c:order val="2"/>
+          <c:tx>
+            <c:strRef>
+              <c:f>Sheet1!$D$1</c:f>
+              <c:strCache>
+                <c:ptCount val="1"/>
+                <c:pt idx="0">
+                  <c:v>Series 3</c:v>
+                </c:pt>
+              </c:strCache>
+            </c:strRef>
+          </c:tx>
+          <c:spPr>
+            <a:solidFill>
+              <a:schemeClr val="accent3"/>
+            </a:solidFill>
+            <a:ln>
+              <a:noFill/>
+            </a:ln>
+            <a:effectLst/>
+          </c:spPr>
+          <c:invertIfNegative val="0"/>
+          <c:cat>
+            <c:strRef>
+              <c:f>Sheet1!$A$2:$A$5</c:f>
+              <c:strCache>
+                <c:ptCount val="4"/>
+                <c:pt idx="0">
+                  <c:v>Category 1</c:v>
+                </c:pt>
+                <c:pt idx="1">
+                  <c:v>Category 2</c:v>
+                </c:pt>
+                <c:pt idx="2">
+                  <c:v>Category 3</c:v>
+                </c:pt>
+                <c:pt idx="3">
+                  <c:v>Category 4</c:v>
+                </c:pt>
+              </c:strCache>
+            </c:strRef>
+          </c:cat>
+          <c:val>
+            <c:numRef>
+              <c:f>Sheet1!$D$2:$D$5</c:f>
+              <c:numCache>
+                <c:formatCode>General</c:formatCode>
+                <c:ptCount val="4"/>
+                <c:pt idx="0">
+                  <c:v>2</c:v>
+                </c:pt>
+                <c:pt idx="1">
+                  <c:v>2</c:v>
+                </c:pt>
+                <c:pt idx="2">
+                  <c:v>3</c:v>
+                </c:pt>
+                <c:pt idx="3">
+                  <c:v>5</c:v>
+                </c:pt>
+              </c:numCache>
+            </c:numRef>
+          </c:val>
+          <c:extLst>
+            <c:ext xmlns:c16="http://schemas.microsoft.com/office/drawing/2014/chart" uri="{C3380CC4-5D6E-409C-BE32-E72D297353CC}">
+              <c16:uniqueId val="{00000002-940B-4F29-8944-8C88D58D7180}"/>
+            </c:ext>
+          </c:extLst>
+        </c:ser>
+        <c:dLbls>
+          <c:showLegendKey val="0"/>
+          <c:showVal val="0"/>
+          <c:showCatName val="0"/>
+          <c:showSerName val="0"/>
+          <c:showPercent val="0"/>
+          <c:showBubbleSize val="0"/>
+        </c:dLbls>
+        <c:gapWidth val="219"/>
+        <c:overlap val="-27"/>
+        <c:axId val="385254456"/>
+        <c:axId val="385256752"/>
+      </c:barChart>
+      <c:catAx>
+        <c:axId val="385254456"/>
+        <c:scaling>
+          <c:orientation val="minMax"/>
+        </c:scaling>
+        <c:delete val="0"/>
+        <c:axPos val="b"/>
+        <c:numFmt formatCode="General" sourceLinked="1"/>
+        <c:majorTickMark val="none"/>
+        <c:minorTickMark val="none"/>
+        <c:tickLblPos val="nextTo"/>
+        <c:spPr>
+          <a:noFill/>
+          <a:ln w="9525" cap="flat" cmpd="sng" algn="ctr">
+            <a:solidFill>
+              <a:schemeClr val="tx1">
+                <a:lumMod val="15000"/>
+                <a:lumOff val="85000"/>
+              </a:schemeClr>
+            </a:solidFill>
+            <a:round/>
+          </a:ln>
+          <a:effectLst/>
+        </c:spPr>
+        <c:txPr>
+          <a:bodyPr rot="-60000000" spcFirstLastPara="1" vertOverflow="ellipsis" vert="horz" wrap="square" anchor="ctr" anchorCtr="1"/>
+          <a:lstStyle/>
+          <a:p>
+            <a:pPr>
+              <a:defRPr sz="1197" b="0" i="0" u="none" strike="noStrike" kern="1200" baseline="0">
+                <a:solidFill>
+                  <a:schemeClr val="tx1">
+                    <a:lumMod val="65000"/>
+                    <a:lumOff val="35000"/>
+                  </a:schemeClr>
+                </a:solidFill>
+                <a:latin typeface="+mn-lt"/>
+                <a:ea typeface="+mn-ea"/>
+                <a:cs typeface="+mn-cs"/>
+              </a:defRPr>
+            </a:pPr>
+            <a:endParaRPr lang="en-US"/>
+          </a:p>
+        </c:txPr>
+        <c:crossAx val="385256752"/>
+        <c:crosses val="autoZero"/>
+        <c:auto val="1"/>
+        <c:lblAlgn val="ctr"/>
+        <c:lblOffset val="100"/>
+        <c:noMultiLvlLbl val="0"/>
+      </c:catAx>
+      <c:valAx>
+        <c:axId val="385256752"/>
+        <c:scaling>
+          <c:orientation val="minMax"/>
+        </c:scaling>
+        <c:delete val="0"/>
+        <c:axPos val="l"/>
+        <c:majorGridlines>
+          <c:spPr>
+            <a:ln w="9525" cap="flat" cmpd="sng" algn="ctr">
+              <a:solidFill>
+                <a:schemeClr val="tx1">
+                  <a:lumMod val="15000"/>
+                  <a:lumOff val="85000"/>
+                </a:schemeClr>
+              </a:solidFill>
+              <a:round/>
+            </a:ln>
+            <a:effectLst/>
+          </c:spPr>
+        </c:majorGridlines>
+        <c:numFmt formatCode="General" sourceLinked="1"/>
+        <c:majorTickMark val="none"/>
+        <c:minorTickMark val="none"/>
+        <c:tickLblPos val="nextTo"/>
+        <c:spPr>
+          <a:noFill/>
+          <a:ln>
+            <a:noFill/>
+          </a:ln>
+          <a:effectLst/>
+        </c:spPr>
+        <c:txPr>
+          <a:bodyPr rot="-60000000" spcFirstLastPara="1" vertOverflow="ellipsis" vert="horz" wrap="square" anchor="ctr" anchorCtr="1"/>
+          <a:lstStyle/>
+          <a:p>
+            <a:pPr>
+              <a:defRPr sz="1197" b="0" i="0" u="none" strike="noStrike" kern="1200" baseline="0">
+                <a:solidFill>
+                  <a:schemeClr val="tx1">
+                    <a:lumMod val="65000"/>
+                    <a:lumOff val="35000"/>
+                  </a:schemeClr>
+                </a:solidFill>
+                <a:latin typeface="+mn-lt"/>
+                <a:ea typeface="+mn-ea"/>
+                <a:cs typeface="+mn-cs"/>
+              </a:defRPr>
+            </a:pPr>
+            <a:endParaRPr lang="en-US"/>
+          </a:p>
+        </c:txPr>
+        <c:crossAx val="385254456"/>
+        <c:crosses val="autoZero"/>
+        <c:crossBetween val="between"/>
+      </c:valAx>
+      <c:spPr>
+        <a:noFill/>
+        <a:ln>
+          <a:noFill/>
+        </a:ln>
+        <a:effectLst/>
+      </c:spPr>
+    </c:plotArea>
+    <c:legend>
+      <c:legendPos val="b"/>
+      <c:overlay val="0"/>
+      <c:spPr>
+        <a:noFill/>
+        <a:ln>
+          <a:noFill/>
+        </a:ln>
+        <a:effectLst/>
+      </c:spPr>
+      <c:txPr>
+        <a:bodyPr rot="0" spcFirstLastPara="1" vertOverflow="ellipsis" vert="horz" wrap="square" anchor="ctr" anchorCtr="1"/>
+        <a:lstStyle/>
+        <a:p>
+          <a:pPr>
+            <a:defRPr sz="1197" b="0" i="0" u="none" strike="noStrike" kern="1200" baseline="0">
+              <a:solidFill>
+                <a:schemeClr val="tx1">
+                  <a:lumMod val="65000"/>
+                  <a:lumOff val="35000"/>
+                </a:schemeClr>
+              </a:solidFill>
+              <a:latin typeface="+mn-lt"/>
+              <a:ea typeface="+mn-ea"/>
+              <a:cs typeface="+mn-cs"/>
+            </a:defRPr>
+          </a:pPr>
+          <a:endParaRPr lang="en-US"/>
+        </a:p>
+      </c:txPr>
+    </c:legend>
+    <c:plotVisOnly val="1"/>
+    <c:dispBlanksAs val="gap"/>
+    <c:extLst>
+      <c:ext xmlns:c16r3="http://schemas.microsoft.com/office/drawing/2017/03/chart" uri="{56B9EC1D-385E-4148-901F-78D8002777C0}">
+        <c16r3:dataDisplayOptions16>
+          <c16r3:dispNaAsBlank val="1"/>
+        </c16r3:dataDisplayOptions16>
+      </c:ext>
+    </c:extLst>
     <c:showDLblsOverMax val="0"/>
   </c:chart>
   <c:spPr>
@@ -1744,6 +2379,46 @@
 </file>
 
 <file path=ppt/charts/colors2.xml><?xml version="1.0" encoding="utf-8"?>
+<cs:colorStyle xmlns:cs="http://schemas.microsoft.com/office/drawing/2012/chartStyle" xmlns:a="http://schemas.openxmlformats.org/drawingml/2006/main" meth="cycle" id="10">
+  <a:schemeClr val="accent1"/>
+  <a:schemeClr val="accent2"/>
+  <a:schemeClr val="accent3"/>
+  <a:schemeClr val="accent4"/>
+  <a:schemeClr val="accent5"/>
+  <a:schemeClr val="accent6"/>
+  <cs:variation/>
+  <cs:variation>
+    <a:lumMod val="60000"/>
+  </cs:variation>
+  <cs:variation>
+    <a:lumMod val="80000"/>
+    <a:lumOff val="20000"/>
+  </cs:variation>
+  <cs:variation>
+    <a:lumMod val="80000"/>
+  </cs:variation>
+  <cs:variation>
+    <a:lumMod val="60000"/>
+    <a:lumOff val="40000"/>
+  </cs:variation>
+  <cs:variation>
+    <a:lumMod val="50000"/>
+  </cs:variation>
+  <cs:variation>
+    <a:lumMod val="70000"/>
+    <a:lumOff val="30000"/>
+  </cs:variation>
+  <cs:variation>
+    <a:lumMod val="70000"/>
+  </cs:variation>
+  <cs:variation>
+    <a:lumMod val="50000"/>
+    <a:lumOff val="50000"/>
+  </cs:variation>
+</cs:colorStyle>
+</file>
+
+<file path=ppt/charts/colors3.xml><?xml version="1.0" encoding="utf-8"?>
 <cs:colorStyle xmlns:cs="http://schemas.microsoft.com/office/drawing/2012/chartStyle" xmlns:a="http://schemas.openxmlformats.org/drawingml/2006/main" meth="cycle" id="10">
   <a:schemeClr val="accent1"/>
   <a:schemeClr val="accent2"/>
@@ -2821,6 +3496,509 @@
 </cs:chartStyle>
 </file>
 
+<file path=ppt/charts/style3.xml><?xml version="1.0" encoding="utf-8"?>
+<cs:chartStyle xmlns:cs="http://schemas.microsoft.com/office/drawing/2012/chartStyle" xmlns:a="http://schemas.openxmlformats.org/drawingml/2006/main" id="201">
+  <cs:axisTitle>
+    <cs:lnRef idx="0"/>
+    <cs:fillRef idx="0"/>
+    <cs:effectRef idx="0"/>
+    <cs:fontRef idx="minor">
+      <a:schemeClr val="tx1">
+        <a:lumMod val="65000"/>
+        <a:lumOff val="35000"/>
+      </a:schemeClr>
+    </cs:fontRef>
+    <cs:defRPr sz="1330" kern="1200"/>
+  </cs:axisTitle>
+  <cs:categoryAxis>
+    <cs:lnRef idx="0"/>
+    <cs:fillRef idx="0"/>
+    <cs:effectRef idx="0"/>
+    <cs:fontRef idx="minor">
+      <a:schemeClr val="tx1">
+        <a:lumMod val="65000"/>
+        <a:lumOff val="35000"/>
+      </a:schemeClr>
+    </cs:fontRef>
+    <cs:spPr>
+      <a:ln w="9525" cap="flat" cmpd="sng" algn="ctr">
+        <a:solidFill>
+          <a:schemeClr val="tx1">
+            <a:lumMod val="15000"/>
+            <a:lumOff val="85000"/>
+          </a:schemeClr>
+        </a:solidFill>
+        <a:round/>
+      </a:ln>
+    </cs:spPr>
+    <cs:defRPr sz="1197" kern="1200"/>
+  </cs:categoryAxis>
+  <cs:chartArea mods="allowNoFillOverride allowNoLineOverride">
+    <cs:lnRef idx="0"/>
+    <cs:fillRef idx="0"/>
+    <cs:effectRef idx="0"/>
+    <cs:fontRef idx="minor">
+      <a:schemeClr val="tx1"/>
+    </cs:fontRef>
+    <cs:spPr>
+      <a:solidFill>
+        <a:schemeClr val="bg1"/>
+      </a:solidFill>
+      <a:ln w="9525" cap="flat" cmpd="sng" algn="ctr">
+        <a:solidFill>
+          <a:schemeClr val="tx1">
+            <a:lumMod val="15000"/>
+            <a:lumOff val="85000"/>
+          </a:schemeClr>
+        </a:solidFill>
+        <a:round/>
+      </a:ln>
+    </cs:spPr>
+    <cs:defRPr sz="1330" kern="1200"/>
+  </cs:chartArea>
+  <cs:dataLabel>
+    <cs:lnRef idx="0"/>
+    <cs:fillRef idx="0"/>
+    <cs:effectRef idx="0"/>
+    <cs:fontRef idx="minor">
+      <a:schemeClr val="tx1">
+        <a:lumMod val="75000"/>
+        <a:lumOff val="25000"/>
+      </a:schemeClr>
+    </cs:fontRef>
+    <cs:defRPr sz="1197" kern="1200"/>
+  </cs:dataLabel>
+  <cs:dataLabelCallout>
+    <cs:lnRef idx="0"/>
+    <cs:fillRef idx="0"/>
+    <cs:effectRef idx="0"/>
+    <cs:fontRef idx="minor">
+      <a:schemeClr val="dk1">
+        <a:lumMod val="65000"/>
+        <a:lumOff val="35000"/>
+      </a:schemeClr>
+    </cs:fontRef>
+    <cs:spPr>
+      <a:solidFill>
+        <a:schemeClr val="lt1"/>
+      </a:solidFill>
+      <a:ln>
+        <a:solidFill>
+          <a:schemeClr val="dk1">
+            <a:lumMod val="25000"/>
+            <a:lumOff val="75000"/>
+          </a:schemeClr>
+        </a:solidFill>
+      </a:ln>
+    </cs:spPr>
+    <cs:defRPr sz="1197" kern="1200"/>
+    <cs:bodyPr rot="0" spcFirstLastPara="1" vertOverflow="clip" horzOverflow="clip" vert="horz" wrap="square" lIns="36576" tIns="18288" rIns="36576" bIns="18288" anchor="ctr" anchorCtr="1">
+      <a:spAutoFit/>
+    </cs:bodyPr>
+  </cs:dataLabelCallout>
+  <cs:dataPoint>
+    <cs:lnRef idx="0"/>
+    <cs:fillRef idx="1">
+      <cs:styleClr val="auto"/>
+    </cs:fillRef>
+    <cs:effectRef idx="0"/>
+    <cs:fontRef idx="minor">
+      <a:schemeClr val="tx1"/>
+    </cs:fontRef>
+  </cs:dataPoint>
+  <cs:dataPoint3D>
+    <cs:lnRef idx="0"/>
+    <cs:fillRef idx="1">
+      <cs:styleClr val="auto"/>
+    </cs:fillRef>
+    <cs:effectRef idx="0"/>
+    <cs:fontRef idx="minor">
+      <a:schemeClr val="tx1"/>
+    </cs:fontRef>
+  </cs:dataPoint3D>
+  <cs:dataPointLine>
+    <cs:lnRef idx="0">
+      <cs:styleClr val="auto"/>
+    </cs:lnRef>
+    <cs:fillRef idx="1"/>
+    <cs:effectRef idx="0"/>
+    <cs:fontRef idx="minor">
+      <a:schemeClr val="tx1"/>
+    </cs:fontRef>
+    <cs:spPr>
+      <a:ln w="28575" cap="rnd">
+        <a:solidFill>
+          <a:schemeClr val="phClr"/>
+        </a:solidFill>
+        <a:round/>
+      </a:ln>
+    </cs:spPr>
+  </cs:dataPointLine>
+  <cs:dataPointMarker>
+    <cs:lnRef idx="0">
+      <cs:styleClr val="auto"/>
+    </cs:lnRef>
+    <cs:fillRef idx="1">
+      <cs:styleClr val="auto"/>
+    </cs:fillRef>
+    <cs:effectRef idx="0"/>
+    <cs:fontRef idx="minor">
+      <a:schemeClr val="tx1"/>
+    </cs:fontRef>
+    <cs:spPr>
+      <a:ln w="9525">
+        <a:solidFill>
+          <a:schemeClr val="phClr"/>
+        </a:solidFill>
+      </a:ln>
+    </cs:spPr>
+  </cs:dataPointMarker>
+  <cs:dataPointMarkerLayout symbol="circle" size="5"/>
+  <cs:dataPointWireframe>
+    <cs:lnRef idx="0">
+      <cs:styleClr val="auto"/>
+    </cs:lnRef>
+    <cs:fillRef idx="1"/>
+    <cs:effectRef idx="0"/>
+    <cs:fontRef idx="minor">
+      <a:schemeClr val="tx1"/>
+    </cs:fontRef>
+    <cs:spPr>
+      <a:ln w="9525" cap="rnd">
+        <a:solidFill>
+          <a:schemeClr val="phClr"/>
+        </a:solidFill>
+        <a:round/>
+      </a:ln>
+    </cs:spPr>
+  </cs:dataPointWireframe>
+  <cs:dataTable>
+    <cs:lnRef idx="0"/>
+    <cs:fillRef idx="0"/>
+    <cs:effectRef idx="0"/>
+    <cs:fontRef idx="minor">
+      <a:schemeClr val="tx1">
+        <a:lumMod val="65000"/>
+        <a:lumOff val="35000"/>
+      </a:schemeClr>
+    </cs:fontRef>
+    <cs:spPr>
+      <a:noFill/>
+      <a:ln w="9525" cap="flat" cmpd="sng" algn="ctr">
+        <a:solidFill>
+          <a:schemeClr val="tx1">
+            <a:lumMod val="15000"/>
+            <a:lumOff val="85000"/>
+          </a:schemeClr>
+        </a:solidFill>
+        <a:round/>
+      </a:ln>
+    </cs:spPr>
+    <cs:defRPr sz="1197" kern="1200"/>
+  </cs:dataTable>
+  <cs:downBar>
+    <cs:lnRef idx="0"/>
+    <cs:fillRef idx="0"/>
+    <cs:effectRef idx="0"/>
+    <cs:fontRef idx="minor">
+      <a:schemeClr val="dk1"/>
+    </cs:fontRef>
+    <cs:spPr>
+      <a:solidFill>
+        <a:schemeClr val="dk1">
+          <a:lumMod val="65000"/>
+          <a:lumOff val="35000"/>
+        </a:schemeClr>
+      </a:solidFill>
+      <a:ln w="9525">
+        <a:solidFill>
+          <a:schemeClr val="tx1">
+            <a:lumMod val="65000"/>
+            <a:lumOff val="35000"/>
+          </a:schemeClr>
+        </a:solidFill>
+      </a:ln>
+    </cs:spPr>
+  </cs:downBar>
+  <cs:dropLine>
+    <cs:lnRef idx="0"/>
+    <cs:fillRef idx="0"/>
+    <cs:effectRef idx="0"/>
+    <cs:fontRef idx="minor">
+      <a:schemeClr val="tx1"/>
+    </cs:fontRef>
+    <cs:spPr>
+      <a:ln w="9525" cap="flat" cmpd="sng" algn="ctr">
+        <a:solidFill>
+          <a:schemeClr val="tx1">
+            <a:lumMod val="35000"/>
+            <a:lumOff val="65000"/>
+          </a:schemeClr>
+        </a:solidFill>
+        <a:round/>
+      </a:ln>
+    </cs:spPr>
+  </cs:dropLine>
+  <cs:errorBar>
+    <cs:lnRef idx="0"/>
+    <cs:fillRef idx="0"/>
+    <cs:effectRef idx="0"/>
+    <cs:fontRef idx="minor">
+      <a:schemeClr val="tx1"/>
+    </cs:fontRef>
+    <cs:spPr>
+      <a:ln w="9525" cap="flat" cmpd="sng" algn="ctr">
+        <a:solidFill>
+          <a:schemeClr val="tx1">
+            <a:lumMod val="65000"/>
+            <a:lumOff val="35000"/>
+          </a:schemeClr>
+        </a:solidFill>
+        <a:round/>
+      </a:ln>
+    </cs:spPr>
+  </cs:errorBar>
+  <cs:floor>
+    <cs:lnRef idx="0"/>
+    <cs:fillRef idx="0"/>
+    <cs:effectRef idx="0"/>
+    <cs:fontRef idx="minor">
+      <a:schemeClr val="tx1"/>
+    </cs:fontRef>
+    <cs:spPr>
+      <a:noFill/>
+      <a:ln>
+        <a:noFill/>
+      </a:ln>
+    </cs:spPr>
+  </cs:floor>
+  <cs:gridlineMajor>
+    <cs:lnRef idx="0"/>
+    <cs:fillRef idx="0"/>
+    <cs:effectRef idx="0"/>
+    <cs:fontRef idx="minor">
+      <a:schemeClr val="tx1"/>
+    </cs:fontRef>
+    <cs:spPr>
+      <a:ln w="9525" cap="flat" cmpd="sng" algn="ctr">
+        <a:solidFill>
+          <a:schemeClr val="tx1">
+            <a:lumMod val="15000"/>
+            <a:lumOff val="85000"/>
+          </a:schemeClr>
+        </a:solidFill>
+        <a:round/>
+      </a:ln>
+    </cs:spPr>
+  </cs:gridlineMajor>
+  <cs:gridlineMinor>
+    <cs:lnRef idx="0"/>
+    <cs:fillRef idx="0"/>
+    <cs:effectRef idx="0"/>
+    <cs:fontRef idx="minor">
+      <a:schemeClr val="tx1"/>
+    </cs:fontRef>
+    <cs:spPr>
+      <a:ln w="9525" cap="flat" cmpd="sng" algn="ctr">
+        <a:solidFill>
+          <a:schemeClr val="tx1">
+            <a:lumMod val="5000"/>
+            <a:lumOff val="95000"/>
+          </a:schemeClr>
+        </a:solidFill>
+        <a:round/>
+      </a:ln>
+    </cs:spPr>
+  </cs:gridlineMinor>
+  <cs:hiLoLine>
+    <cs:lnRef idx="0"/>
+    <cs:fillRef idx="0"/>
+    <cs:effectRef idx="0"/>
+    <cs:fontRef idx="minor">
+      <a:schemeClr val="tx1"/>
+    </cs:fontRef>
+    <cs:spPr>
+      <a:ln w="9525" cap="flat" cmpd="sng" algn="ctr">
+        <a:solidFill>
+          <a:schemeClr val="tx1">
+            <a:lumMod val="75000"/>
+            <a:lumOff val="25000"/>
+          </a:schemeClr>
+        </a:solidFill>
+        <a:round/>
+      </a:ln>
+    </cs:spPr>
+  </cs:hiLoLine>
+  <cs:leaderLine>
+    <cs:lnRef idx="0"/>
+    <cs:fillRef idx="0"/>
+    <cs:effectRef idx="0"/>
+    <cs:fontRef idx="minor">
+      <a:schemeClr val="tx1"/>
+    </cs:fontRef>
+    <cs:spPr>
+      <a:ln w="9525" cap="flat" cmpd="sng" algn="ctr">
+        <a:solidFill>
+          <a:schemeClr val="tx1">
+            <a:lumMod val="35000"/>
+            <a:lumOff val="65000"/>
+          </a:schemeClr>
+        </a:solidFill>
+        <a:round/>
+      </a:ln>
+    </cs:spPr>
+  </cs:leaderLine>
+  <cs:legend>
+    <cs:lnRef idx="0"/>
+    <cs:fillRef idx="0"/>
+    <cs:effectRef idx="0"/>
+    <cs:fontRef idx="minor">
+      <a:schemeClr val="tx1">
+        <a:lumMod val="65000"/>
+        <a:lumOff val="35000"/>
+      </a:schemeClr>
+    </cs:fontRef>
+    <cs:defRPr sz="1197" kern="1200"/>
+  </cs:legend>
+  <cs:plotArea mods="allowNoFillOverride allowNoLineOverride">
+    <cs:lnRef idx="0"/>
+    <cs:fillRef idx="0"/>
+    <cs:effectRef idx="0"/>
+    <cs:fontRef idx="minor">
+      <a:schemeClr val="tx1"/>
+    </cs:fontRef>
+  </cs:plotArea>
+  <cs:plotArea3D mods="allowNoFillOverride allowNoLineOverride">
+    <cs:lnRef idx="0"/>
+    <cs:fillRef idx="0"/>
+    <cs:effectRef idx="0"/>
+    <cs:fontRef idx="minor">
+      <a:schemeClr val="tx1"/>
+    </cs:fontRef>
+  </cs:plotArea3D>
+  <cs:seriesAxis>
+    <cs:lnRef idx="0"/>
+    <cs:fillRef idx="0"/>
+    <cs:effectRef idx="0"/>
+    <cs:fontRef idx="minor">
+      <a:schemeClr val="tx1">
+        <a:lumMod val="65000"/>
+        <a:lumOff val="35000"/>
+      </a:schemeClr>
+    </cs:fontRef>
+    <cs:defRPr sz="1197" kern="1200"/>
+  </cs:seriesAxis>
+  <cs:seriesLine>
+    <cs:lnRef idx="0"/>
+    <cs:fillRef idx="0"/>
+    <cs:effectRef idx="0"/>
+    <cs:fontRef idx="minor">
+      <a:schemeClr val="tx1"/>
+    </cs:fontRef>
+    <cs:spPr>
+      <a:ln w="9525" cap="flat" cmpd="sng" algn="ctr">
+        <a:solidFill>
+          <a:schemeClr val="tx1">
+            <a:lumMod val="35000"/>
+            <a:lumOff val="65000"/>
+          </a:schemeClr>
+        </a:solidFill>
+        <a:round/>
+      </a:ln>
+    </cs:spPr>
+  </cs:seriesLine>
+  <cs:title>
+    <cs:lnRef idx="0"/>
+    <cs:fillRef idx="0"/>
+    <cs:effectRef idx="0"/>
+    <cs:fontRef idx="minor">
+      <a:schemeClr val="tx1">
+        <a:lumMod val="65000"/>
+        <a:lumOff val="35000"/>
+      </a:schemeClr>
+    </cs:fontRef>
+    <cs:defRPr sz="1862" b="0" kern="1200" spc="0" baseline="0"/>
+  </cs:title>
+  <cs:trendline>
+    <cs:lnRef idx="0">
+      <cs:styleClr val="auto"/>
+    </cs:lnRef>
+    <cs:fillRef idx="0"/>
+    <cs:effectRef idx="0"/>
+    <cs:fontRef idx="minor">
+      <a:schemeClr val="tx1"/>
+    </cs:fontRef>
+    <cs:spPr>
+      <a:ln w="19050" cap="rnd">
+        <a:solidFill>
+          <a:schemeClr val="phClr"/>
+        </a:solidFill>
+        <a:prstDash val="sysDot"/>
+      </a:ln>
+    </cs:spPr>
+  </cs:trendline>
+  <cs:trendlineLabel>
+    <cs:lnRef idx="0"/>
+    <cs:fillRef idx="0"/>
+    <cs:effectRef idx="0"/>
+    <cs:fontRef idx="minor">
+      <a:schemeClr val="tx1">
+        <a:lumMod val="65000"/>
+        <a:lumOff val="35000"/>
+      </a:schemeClr>
+    </cs:fontRef>
+    <cs:defRPr sz="1197" kern="1200"/>
+  </cs:trendlineLabel>
+  <cs:upBar>
+    <cs:lnRef idx="0"/>
+    <cs:fillRef idx="0"/>
+    <cs:effectRef idx="0"/>
+    <cs:fontRef idx="minor">
+      <a:schemeClr val="dk1"/>
+    </cs:fontRef>
+    <cs:spPr>
+      <a:solidFill>
+        <a:schemeClr val="lt1"/>
+      </a:solidFill>
+      <a:ln w="9525">
+        <a:solidFill>
+          <a:schemeClr val="tx1">
+            <a:lumMod val="15000"/>
+            <a:lumOff val="85000"/>
+          </a:schemeClr>
+        </a:solidFill>
+      </a:ln>
+    </cs:spPr>
+  </cs:upBar>
+  <cs:valueAxis>
+    <cs:lnRef idx="0"/>
+    <cs:fillRef idx="0"/>
+    <cs:effectRef idx="0"/>
+    <cs:fontRef idx="minor">
+      <a:schemeClr val="tx1">
+        <a:lumMod val="65000"/>
+        <a:lumOff val="35000"/>
+      </a:schemeClr>
+    </cs:fontRef>
+    <cs:defRPr sz="1197" kern="1200"/>
+  </cs:valueAxis>
+  <cs:wall>
+    <cs:lnRef idx="0"/>
+    <cs:fillRef idx="0"/>
+    <cs:effectRef idx="0"/>
+    <cs:fontRef idx="minor">
+      <a:schemeClr val="tx1"/>
+    </cs:fontRef>
+    <cs:spPr>
+      <a:noFill/>
+      <a:ln>
+        <a:noFill/>
+      </a:ln>
+    </cs:spPr>
+  </cs:wall>
+</cs:chartStyle>
+</file>
+
 <file path=ppt/slideLayouts/slideLayout1.xml><?xml version="1.0" encoding="utf-8"?>
 <p:sldLayout xmlns:a="http://schemas.openxmlformats.org/drawingml/2006/main" xmlns:r="http://schemas.openxmlformats.org/officeDocument/2006/relationships" xmlns:p="http://schemas.openxmlformats.org/presentationml/2006/main" type="title" preserve="1">
   <p:cSld name="Title Slide">
@@ -2863,7 +4041,7 @@
           </a:lstStyle>
           <a:p>
             <a:r>
-              <a:rPr lang="en-US" smtClean="0"/>
+              <a:rPr lang="en-US"/>
               <a:t>Click to edit Master title style</a:t>
             </a:r>
             <a:endParaRPr lang="en-GB"/>
@@ -2928,7 +4106,7 @@
           </a:lstStyle>
           <a:p>
             <a:r>
-              <a:rPr lang="en-US" smtClean="0"/>
+              <a:rPr lang="en-US"/>
               <a:t>Click to edit Master subtitle style</a:t>
             </a:r>
             <a:endParaRPr lang="en-GB"/>
@@ -2952,7 +4130,7 @@
           <a:p>
             <a:fld id="{883BD084-2C06-41D0-A826-B3CA4EDA1986}" type="datetimeFigureOut">
               <a:rPr lang="en-GB" smtClean="0"/>
-              <a:t>19/04/2017</a:t>
+              <a:t>05/12/2017</a:t>
             </a:fld>
             <a:endParaRPr lang="en-GB"/>
           </a:p>
@@ -3046,7 +4224,7 @@
           <a:lstStyle/>
           <a:p>
             <a:r>
-              <a:rPr lang="en-US" smtClean="0"/>
+              <a:rPr lang="en-US"/>
               <a:t>Click to edit Master title style</a:t>
             </a:r>
             <a:endParaRPr lang="en-GB"/>
@@ -3070,35 +4248,35 @@
           <a:p>
             <a:pPr lvl="0"/>
             <a:r>
-              <a:rPr lang="en-US" smtClean="0"/>
+              <a:rPr lang="en-US"/>
               <a:t>Click to edit Master text styles</a:t>
             </a:r>
           </a:p>
           <a:p>
             <a:pPr lvl="1"/>
             <a:r>
-              <a:rPr lang="en-US" smtClean="0"/>
+              <a:rPr lang="en-US"/>
               <a:t>Second level</a:t>
             </a:r>
           </a:p>
           <a:p>
             <a:pPr lvl="2"/>
             <a:r>
-              <a:rPr lang="en-US" smtClean="0"/>
+              <a:rPr lang="en-US"/>
               <a:t>Third level</a:t>
             </a:r>
           </a:p>
           <a:p>
             <a:pPr lvl="3"/>
             <a:r>
-              <a:rPr lang="en-US" smtClean="0"/>
+              <a:rPr lang="en-US"/>
               <a:t>Fourth level</a:t>
             </a:r>
           </a:p>
           <a:p>
             <a:pPr lvl="4"/>
             <a:r>
-              <a:rPr lang="en-US" smtClean="0"/>
+              <a:rPr lang="en-US"/>
               <a:t>Fifth level</a:t>
             </a:r>
             <a:endParaRPr lang="en-GB"/>
@@ -3122,7 +4300,7 @@
           <a:p>
             <a:fld id="{883BD084-2C06-41D0-A826-B3CA4EDA1986}" type="datetimeFigureOut">
               <a:rPr lang="en-GB" smtClean="0"/>
-              <a:t>19/04/2017</a:t>
+              <a:t>05/12/2017</a:t>
             </a:fld>
             <a:endParaRPr lang="en-GB"/>
           </a:p>
@@ -3221,7 +4399,7 @@
           <a:lstStyle/>
           <a:p>
             <a:r>
-              <a:rPr lang="en-US" smtClean="0"/>
+              <a:rPr lang="en-US"/>
               <a:t>Click to edit Master title style</a:t>
             </a:r>
             <a:endParaRPr lang="en-GB"/>
@@ -3250,35 +4428,35 @@
           <a:p>
             <a:pPr lvl="0"/>
             <a:r>
-              <a:rPr lang="en-US" smtClean="0"/>
+              <a:rPr lang="en-US"/>
               <a:t>Click to edit Master text styles</a:t>
             </a:r>
           </a:p>
           <a:p>
             <a:pPr lvl="1"/>
             <a:r>
-              <a:rPr lang="en-US" smtClean="0"/>
+              <a:rPr lang="en-US"/>
               <a:t>Second level</a:t>
             </a:r>
           </a:p>
           <a:p>
             <a:pPr lvl="2"/>
             <a:r>
-              <a:rPr lang="en-US" smtClean="0"/>
+              <a:rPr lang="en-US"/>
               <a:t>Third level</a:t>
             </a:r>
           </a:p>
           <a:p>
             <a:pPr lvl="3"/>
             <a:r>
-              <a:rPr lang="en-US" smtClean="0"/>
+              <a:rPr lang="en-US"/>
               <a:t>Fourth level</a:t>
             </a:r>
           </a:p>
           <a:p>
             <a:pPr lvl="4"/>
             <a:r>
-              <a:rPr lang="en-US" smtClean="0"/>
+              <a:rPr lang="en-US"/>
               <a:t>Fifth level</a:t>
             </a:r>
             <a:endParaRPr lang="en-GB"/>
@@ -3302,7 +4480,7 @@
           <a:p>
             <a:fld id="{883BD084-2C06-41D0-A826-B3CA4EDA1986}" type="datetimeFigureOut">
               <a:rPr lang="en-GB" smtClean="0"/>
-              <a:t>19/04/2017</a:t>
+              <a:t>05/12/2017</a:t>
             </a:fld>
             <a:endParaRPr lang="en-GB"/>
           </a:p>
@@ -3396,7 +4574,7 @@
           <a:lstStyle/>
           <a:p>
             <a:r>
-              <a:rPr lang="en-US" smtClean="0"/>
+              <a:rPr lang="en-US"/>
               <a:t>Click to edit Master title style</a:t>
             </a:r>
             <a:endParaRPr lang="en-GB"/>
@@ -3420,35 +4598,35 @@
           <a:p>
             <a:pPr lvl="0"/>
             <a:r>
-              <a:rPr lang="en-US" smtClean="0"/>
+              <a:rPr lang="en-US"/>
               <a:t>Click to edit Master text styles</a:t>
             </a:r>
           </a:p>
           <a:p>
             <a:pPr lvl="1"/>
             <a:r>
-              <a:rPr lang="en-US" smtClean="0"/>
+              <a:rPr lang="en-US"/>
               <a:t>Second level</a:t>
             </a:r>
           </a:p>
           <a:p>
             <a:pPr lvl="2"/>
             <a:r>
-              <a:rPr lang="en-US" smtClean="0"/>
+              <a:rPr lang="en-US"/>
               <a:t>Third level</a:t>
             </a:r>
           </a:p>
           <a:p>
             <a:pPr lvl="3"/>
             <a:r>
-              <a:rPr lang="en-US" smtClean="0"/>
+              <a:rPr lang="en-US"/>
               <a:t>Fourth level</a:t>
             </a:r>
           </a:p>
           <a:p>
             <a:pPr lvl="4"/>
             <a:r>
-              <a:rPr lang="en-US" smtClean="0"/>
+              <a:rPr lang="en-US"/>
               <a:t>Fifth level</a:t>
             </a:r>
             <a:endParaRPr lang="en-GB"/>
@@ -3472,7 +4650,7 @@
           <a:p>
             <a:fld id="{883BD084-2C06-41D0-A826-B3CA4EDA1986}" type="datetimeFigureOut">
               <a:rPr lang="en-GB" smtClean="0"/>
-              <a:t>19/04/2017</a:t>
+              <a:t>05/12/2017</a:t>
             </a:fld>
             <a:endParaRPr lang="en-GB"/>
           </a:p>
@@ -3575,7 +4753,7 @@
           </a:lstStyle>
           <a:p>
             <a:r>
-              <a:rPr lang="en-US" smtClean="0"/>
+              <a:rPr lang="en-US"/>
               <a:t>Click to edit Master title style</a:t>
             </a:r>
             <a:endParaRPr lang="en-GB"/>
@@ -3695,7 +4873,7 @@
           <a:p>
             <a:pPr lvl="0"/>
             <a:r>
-              <a:rPr lang="en-US" smtClean="0"/>
+              <a:rPr lang="en-US"/>
               <a:t>Click to edit Master text styles</a:t>
             </a:r>
           </a:p>
@@ -3718,7 +4896,7 @@
           <a:p>
             <a:fld id="{883BD084-2C06-41D0-A826-B3CA4EDA1986}" type="datetimeFigureOut">
               <a:rPr lang="en-GB" smtClean="0"/>
-              <a:t>19/04/2017</a:t>
+              <a:t>05/12/2017</a:t>
             </a:fld>
             <a:endParaRPr lang="en-GB"/>
           </a:p>
@@ -3812,7 +4990,7 @@
           <a:lstStyle/>
           <a:p>
             <a:r>
-              <a:rPr lang="en-US" smtClean="0"/>
+              <a:rPr lang="en-US"/>
               <a:t>Click to edit Master title style</a:t>
             </a:r>
             <a:endParaRPr lang="en-GB"/>
@@ -3841,35 +5019,35 @@
           <a:p>
             <a:pPr lvl="0"/>
             <a:r>
-              <a:rPr lang="en-US" smtClean="0"/>
+              <a:rPr lang="en-US"/>
               <a:t>Click to edit Master text styles</a:t>
             </a:r>
           </a:p>
           <a:p>
             <a:pPr lvl="1"/>
             <a:r>
-              <a:rPr lang="en-US" smtClean="0"/>
+              <a:rPr lang="en-US"/>
               <a:t>Second level</a:t>
             </a:r>
           </a:p>
           <a:p>
             <a:pPr lvl="2"/>
             <a:r>
-              <a:rPr lang="en-US" smtClean="0"/>
+              <a:rPr lang="en-US"/>
               <a:t>Third level</a:t>
             </a:r>
           </a:p>
           <a:p>
             <a:pPr lvl="3"/>
             <a:r>
-              <a:rPr lang="en-US" smtClean="0"/>
+              <a:rPr lang="en-US"/>
               <a:t>Fourth level</a:t>
             </a:r>
           </a:p>
           <a:p>
             <a:pPr lvl="4"/>
             <a:r>
-              <a:rPr lang="en-US" smtClean="0"/>
+              <a:rPr lang="en-US"/>
               <a:t>Fifth level</a:t>
             </a:r>
             <a:endParaRPr lang="en-GB"/>
@@ -3898,35 +5076,35 @@
           <a:p>
             <a:pPr lvl="0"/>
             <a:r>
-              <a:rPr lang="en-US" smtClean="0"/>
+              <a:rPr lang="en-US"/>
               <a:t>Click to edit Master text styles</a:t>
             </a:r>
           </a:p>
           <a:p>
             <a:pPr lvl="1"/>
             <a:r>
-              <a:rPr lang="en-US" smtClean="0"/>
+              <a:rPr lang="en-US"/>
               <a:t>Second level</a:t>
             </a:r>
           </a:p>
           <a:p>
             <a:pPr lvl="2"/>
             <a:r>
-              <a:rPr lang="en-US" smtClean="0"/>
+              <a:rPr lang="en-US"/>
               <a:t>Third level</a:t>
             </a:r>
           </a:p>
           <a:p>
             <a:pPr lvl="3"/>
             <a:r>
-              <a:rPr lang="en-US" smtClean="0"/>
+              <a:rPr lang="en-US"/>
               <a:t>Fourth level</a:t>
             </a:r>
           </a:p>
           <a:p>
             <a:pPr lvl="4"/>
             <a:r>
-              <a:rPr lang="en-US" smtClean="0"/>
+              <a:rPr lang="en-US"/>
               <a:t>Fifth level</a:t>
             </a:r>
             <a:endParaRPr lang="en-GB"/>
@@ -3950,7 +5128,7 @@
           <a:p>
             <a:fld id="{883BD084-2C06-41D0-A826-B3CA4EDA1986}" type="datetimeFigureOut">
               <a:rPr lang="en-GB" smtClean="0"/>
-              <a:t>19/04/2017</a:t>
+              <a:t>05/12/2017</a:t>
             </a:fld>
             <a:endParaRPr lang="en-GB"/>
           </a:p>
@@ -4049,7 +5227,7 @@
           <a:lstStyle/>
           <a:p>
             <a:r>
-              <a:rPr lang="en-US" smtClean="0"/>
+              <a:rPr lang="en-US"/>
               <a:t>Click to edit Master title style</a:t>
             </a:r>
             <a:endParaRPr lang="en-GB"/>
@@ -4115,7 +5293,7 @@
           <a:p>
             <a:pPr lvl="0"/>
             <a:r>
-              <a:rPr lang="en-US" smtClean="0"/>
+              <a:rPr lang="en-US"/>
               <a:t>Click to edit Master text styles</a:t>
             </a:r>
           </a:p>
@@ -4143,35 +5321,35 @@
           <a:p>
             <a:pPr lvl="0"/>
             <a:r>
-              <a:rPr lang="en-US" smtClean="0"/>
+              <a:rPr lang="en-US"/>
               <a:t>Click to edit Master text styles</a:t>
             </a:r>
           </a:p>
           <a:p>
             <a:pPr lvl="1"/>
             <a:r>
-              <a:rPr lang="en-US" smtClean="0"/>
+              <a:rPr lang="en-US"/>
               <a:t>Second level</a:t>
             </a:r>
           </a:p>
           <a:p>
             <a:pPr lvl="2"/>
             <a:r>
-              <a:rPr lang="en-US" smtClean="0"/>
+              <a:rPr lang="en-US"/>
               <a:t>Third level</a:t>
             </a:r>
           </a:p>
           <a:p>
             <a:pPr lvl="3"/>
             <a:r>
-              <a:rPr lang="en-US" smtClean="0"/>
+              <a:rPr lang="en-US"/>
               <a:t>Fourth level</a:t>
             </a:r>
           </a:p>
           <a:p>
             <a:pPr lvl="4"/>
             <a:r>
-              <a:rPr lang="en-US" smtClean="0"/>
+              <a:rPr lang="en-US"/>
               <a:t>Fifth level</a:t>
             </a:r>
             <a:endParaRPr lang="en-GB"/>
@@ -4237,7 +5415,7 @@
           <a:p>
             <a:pPr lvl="0"/>
             <a:r>
-              <a:rPr lang="en-US" smtClean="0"/>
+              <a:rPr lang="en-US"/>
               <a:t>Click to edit Master text styles</a:t>
             </a:r>
           </a:p>
@@ -4265,35 +5443,35 @@
           <a:p>
             <a:pPr lvl="0"/>
             <a:r>
-              <a:rPr lang="en-US" smtClean="0"/>
+              <a:rPr lang="en-US"/>
               <a:t>Click to edit Master text styles</a:t>
             </a:r>
           </a:p>
           <a:p>
             <a:pPr lvl="1"/>
             <a:r>
-              <a:rPr lang="en-US" smtClean="0"/>
+              <a:rPr lang="en-US"/>
               <a:t>Second level</a:t>
             </a:r>
           </a:p>
           <a:p>
             <a:pPr lvl="2"/>
             <a:r>
-              <a:rPr lang="en-US" smtClean="0"/>
+              <a:rPr lang="en-US"/>
               <a:t>Third level</a:t>
             </a:r>
           </a:p>
           <a:p>
             <a:pPr lvl="3"/>
             <a:r>
-              <a:rPr lang="en-US" smtClean="0"/>
+              <a:rPr lang="en-US"/>
               <a:t>Fourth level</a:t>
             </a:r>
           </a:p>
           <a:p>
             <a:pPr lvl="4"/>
             <a:r>
-              <a:rPr lang="en-US" smtClean="0"/>
+              <a:rPr lang="en-US"/>
               <a:t>Fifth level</a:t>
             </a:r>
             <a:endParaRPr lang="en-GB"/>
@@ -4317,7 +5495,7 @@
           <a:p>
             <a:fld id="{883BD084-2C06-41D0-A826-B3CA4EDA1986}" type="datetimeFigureOut">
               <a:rPr lang="en-GB" smtClean="0"/>
-              <a:t>19/04/2017</a:t>
+              <a:t>05/12/2017</a:t>
             </a:fld>
             <a:endParaRPr lang="en-GB"/>
           </a:p>
@@ -4411,7 +5589,7 @@
           <a:lstStyle/>
           <a:p>
             <a:r>
-              <a:rPr lang="en-US" smtClean="0"/>
+              <a:rPr lang="en-US"/>
               <a:t>Click to edit Master title style</a:t>
             </a:r>
             <a:endParaRPr lang="en-GB"/>
@@ -4435,7 +5613,7 @@
           <a:p>
             <a:fld id="{883BD084-2C06-41D0-A826-B3CA4EDA1986}" type="datetimeFigureOut">
               <a:rPr lang="en-GB" smtClean="0"/>
-              <a:t>19/04/2017</a:t>
+              <a:t>05/12/2017</a:t>
             </a:fld>
             <a:endParaRPr lang="en-GB"/>
           </a:p>
@@ -4530,7 +5708,7 @@
           <a:p>
             <a:fld id="{883BD084-2C06-41D0-A826-B3CA4EDA1986}" type="datetimeFigureOut">
               <a:rPr lang="en-GB" smtClean="0"/>
-              <a:t>19/04/2017</a:t>
+              <a:t>05/12/2017</a:t>
             </a:fld>
             <a:endParaRPr lang="en-GB"/>
           </a:p>
@@ -6873,7 +8051,7 @@
           </a:lstStyle>
           <a:p>
             <a:r>
-              <a:rPr lang="en-US" smtClean="0"/>
+              <a:rPr lang="en-US"/>
               <a:t>Click to edit Master title style</a:t>
             </a:r>
             <a:endParaRPr lang="en-GB"/>
@@ -6930,35 +8108,35 @@
           <a:p>
             <a:pPr lvl="0"/>
             <a:r>
-              <a:rPr lang="en-US" smtClean="0"/>
+              <a:rPr lang="en-US"/>
               <a:t>Click to edit Master text styles</a:t>
             </a:r>
           </a:p>
           <a:p>
             <a:pPr lvl="1"/>
             <a:r>
-              <a:rPr lang="en-US" smtClean="0"/>
+              <a:rPr lang="en-US"/>
               <a:t>Second level</a:t>
             </a:r>
           </a:p>
           <a:p>
             <a:pPr lvl="2"/>
             <a:r>
-              <a:rPr lang="en-US" smtClean="0"/>
+              <a:rPr lang="en-US"/>
               <a:t>Third level</a:t>
             </a:r>
           </a:p>
           <a:p>
             <a:pPr lvl="3"/>
             <a:r>
-              <a:rPr lang="en-US" smtClean="0"/>
+              <a:rPr lang="en-US"/>
               <a:t>Fourth level</a:t>
             </a:r>
           </a:p>
           <a:p>
             <a:pPr lvl="4"/>
             <a:r>
-              <a:rPr lang="en-US" smtClean="0"/>
+              <a:rPr lang="en-US"/>
               <a:t>Fifth level</a:t>
             </a:r>
             <a:endParaRPr lang="en-GB"/>
@@ -7024,7 +8202,7 @@
           <a:p>
             <a:pPr lvl="0"/>
             <a:r>
-              <a:rPr lang="en-US" smtClean="0"/>
+              <a:rPr lang="en-US"/>
               <a:t>Click to edit Master text styles</a:t>
             </a:r>
           </a:p>
@@ -7047,7 +8225,7 @@
           <a:p>
             <a:fld id="{883BD084-2C06-41D0-A826-B3CA4EDA1986}" type="datetimeFigureOut">
               <a:rPr lang="en-GB" smtClean="0"/>
-              <a:t>19/04/2017</a:t>
+              <a:t>05/12/2017</a:t>
             </a:fld>
             <a:endParaRPr lang="en-GB"/>
           </a:p>
@@ -7150,7 +8328,7 @@
           </a:lstStyle>
           <a:p>
             <a:r>
-              <a:rPr lang="en-US" smtClean="0"/>
+              <a:rPr lang="en-US"/>
               <a:t>Click to edit Master title style</a:t>
             </a:r>
             <a:endParaRPr lang="en-GB"/>
@@ -7277,7 +8455,7 @@
           <a:p>
             <a:pPr lvl="0"/>
             <a:r>
-              <a:rPr lang="en-US" smtClean="0"/>
+              <a:rPr lang="en-US"/>
               <a:t>Click to edit Master text styles</a:t>
             </a:r>
           </a:p>
@@ -7300,7 +8478,7 @@
           <a:p>
             <a:fld id="{883BD084-2C06-41D0-A826-B3CA4EDA1986}" type="datetimeFigureOut">
               <a:rPr lang="en-GB" smtClean="0"/>
-              <a:t>19/04/2017</a:t>
+              <a:t>05/12/2017</a:t>
             </a:fld>
             <a:endParaRPr lang="en-GB"/>
           </a:p>
@@ -7409,7 +8587,7 @@
           <a:lstStyle/>
           <a:p>
             <a:r>
-              <a:rPr lang="en-US" smtClean="0"/>
+              <a:rPr lang="en-US"/>
               <a:t>Click to edit Master title style</a:t>
             </a:r>
             <a:endParaRPr lang="en-GB"/>
@@ -7443,35 +8621,35 @@
           <a:p>
             <a:pPr lvl="0"/>
             <a:r>
-              <a:rPr lang="en-US" smtClean="0"/>
+              <a:rPr lang="en-US"/>
               <a:t>Click to edit Master text styles</a:t>
             </a:r>
           </a:p>
           <a:p>
             <a:pPr lvl="1"/>
             <a:r>
-              <a:rPr lang="en-US" smtClean="0"/>
+              <a:rPr lang="en-US"/>
               <a:t>Second level</a:t>
             </a:r>
           </a:p>
           <a:p>
             <a:pPr lvl="2"/>
             <a:r>
-              <a:rPr lang="en-US" smtClean="0"/>
+              <a:rPr lang="en-US"/>
               <a:t>Third level</a:t>
             </a:r>
           </a:p>
           <a:p>
             <a:pPr lvl="3"/>
             <a:r>
-              <a:rPr lang="en-US" smtClean="0"/>
+              <a:rPr lang="en-US"/>
               <a:t>Fourth level</a:t>
             </a:r>
           </a:p>
           <a:p>
             <a:pPr lvl="4"/>
             <a:r>
-              <a:rPr lang="en-US" smtClean="0"/>
+              <a:rPr lang="en-US"/>
               <a:t>Fifth level</a:t>
             </a:r>
             <a:endParaRPr lang="en-GB"/>
@@ -7513,7 +8691,7 @@
           <a:p>
             <a:fld id="{883BD084-2C06-41D0-A826-B3CA4EDA1986}" type="datetimeFigureOut">
               <a:rPr lang="en-GB" smtClean="0"/>
-              <a:t>19/04/2017</a:t>
+              <a:t>05/12/2017</a:t>
             </a:fld>
             <a:endParaRPr lang="en-GB"/>
           </a:p>
@@ -7950,13 +9128,6 @@
   <p:clrMapOvr>
     <a:masterClrMapping/>
   </p:clrMapOvr>
-  <p:timing>
-    <p:tnLst>
-      <p:par>
-        <p:cTn id="1" dur="indefinite" restart="never" nodeType="tmRoot"/>
-      </p:par>
-    </p:tnLst>
-  </p:timing>
 </p:sld>
 </file>
 
@@ -8009,13 +9180,58 @@
   <p:clrMapOvr>
     <a:masterClrMapping/>
   </p:clrMapOvr>
-  <p:timing>
-    <p:tnLst>
-      <p:par>
-        <p:cTn id="1" dur="indefinite" restart="never" nodeType="tmRoot"/>
-      </p:par>
-    </p:tnLst>
-  </p:timing>
+</p:sld>
+</file>
+
+<file path=ppt/slides/slide3.xml><?xml version="1.0" encoding="utf-8"?>
+<p:sld xmlns:a="http://schemas.openxmlformats.org/drawingml/2006/main" xmlns:r="http://schemas.openxmlformats.org/officeDocument/2006/relationships" xmlns:p="http://schemas.openxmlformats.org/presentationml/2006/main">
+  <p:cSld>
+    <p:spTree>
+      <p:nvGrpSpPr>
+        <p:cNvPr id="1" name=""/>
+        <p:cNvGrpSpPr/>
+        <p:nvPr/>
+      </p:nvGrpSpPr>
+      <p:grpSpPr>
+        <a:xfrm>
+          <a:off x="0" y="0"/>
+          <a:ext cx="0" cy="0"/>
+          <a:chOff x="0" y="0"/>
+          <a:chExt cx="0" cy="0"/>
+        </a:xfrm>
+      </p:grpSpPr>
+      <p:graphicFrame>
+        <p:nvGraphicFramePr>
+          <p:cNvPr id="4" name="Chart 3">
+            <a:extLst>
+              <a:ext uri="{FF2B5EF4-FFF2-40B4-BE49-F238E27FC236}">
+                <a16:creationId xmlns:a16="http://schemas.microsoft.com/office/drawing/2014/main" id="{74C9FC50-8586-4B76-9686-D6EDC3BB0CC5}"/>
+              </a:ext>
+            </a:extLst>
+          </p:cNvPr>
+          <p:cNvGraphicFramePr/>
+          <p:nvPr/>
+        </p:nvGraphicFramePr>
+        <p:xfrm>
+          <a:off x="2032000" y="719666"/>
+          <a:ext cx="8128000" cy="5418667"/>
+        </p:xfrm>
+        <a:graphic>
+          <a:graphicData uri="http://schemas.openxmlformats.org/drawingml/2006/chart">
+            <c:chart xmlns:c="http://schemas.openxmlformats.org/drawingml/2006/chart" xmlns:r="http://schemas.openxmlformats.org/officeDocument/2006/relationships" r:id="rId2"/>
+          </a:graphicData>
+        </a:graphic>
+      </p:graphicFrame>
+    </p:spTree>
+    <p:extLst>
+      <p:ext uri="{BB962C8B-B14F-4D97-AF65-F5344CB8AC3E}">
+        <p14:creationId xmlns:p14="http://schemas.microsoft.com/office/powerpoint/2010/main" val="3847496844"/>
+      </p:ext>
+    </p:extLst>
+  </p:cSld>
+  <p:clrMapOvr>
+    <a:masterClrMapping/>
+  </p:clrMapOvr>
 </p:sld>
 </file>
 

</xml_diff>